<commit_message>
dont remember what is changed exactly
</commit_message>
<xml_diff>
--- a/project/presentation.pptx
+++ b/project/presentation.pptx
@@ -3965,7 +3965,7 @@
               <a:rPr lang="x-none" sz="2000" dirty="0">
                 <a:cs typeface="Arial" charset="0"/>
               </a:rPr>
-              <a:t>ur program will allows the user to</a:t>
+              <a:t>ur program will allow the user to</a:t>
             </a:r>
             <a:r>
               <a:rPr lang="ko-KR" altLang="en-US" sz="2000" dirty="0">
@@ -4051,9 +4051,27 @@
               <a:rPr lang="ko-KR" altLang="en-US" sz="2000" dirty="0">
                 <a:cs typeface="Arial" charset="0"/>
               </a:rPr>
-              <a:t>The washing process will be ongoing after the payment has been done by customer and the payment receipt will be printed for the  user.</a:t>
-            </a:r>
-            <a:endParaRPr lang="ko-KR" altLang="en-US" sz="2000" dirty="0">
+              <a:t>The washing process will be ongoing after the payment has been done by customer and the payment receipt will be printed for    the </a:t>
+            </a:r>
+            <a:r>
+              <a:rPr lang="x-none" altLang="ko-KR" sz="2000" dirty="0">
+                <a:cs typeface="Arial" charset="0"/>
+              </a:rPr>
+              <a:t>selected</a:t>
+            </a:r>
+            <a:r>
+              <a:rPr lang="ko-KR" altLang="en-US" sz="2000" dirty="0">
+                <a:cs typeface="Arial" charset="0"/>
+              </a:rPr>
+              <a:t> user </a:t>
+            </a:r>
+            <a:r>
+              <a:rPr lang="x-none" altLang="ko-KR" sz="2000" dirty="0">
+                <a:cs typeface="Arial" charset="0"/>
+              </a:rPr>
+              <a:t>service is finished.</a:t>
+            </a:r>
+            <a:endParaRPr lang="x-none" altLang="ko-KR" sz="2000" dirty="0">
               <a:cs typeface="Arial" charset="0"/>
             </a:endParaRPr>
           </a:p>
@@ -4160,13 +4178,43 @@
               <a:rPr lang="ko-KR" altLang="en-US" sz="2000" dirty="0">
                 <a:cs typeface="Arial" charset="0"/>
               </a:rPr>
-              <a:t> Decoration, separating between different parts of the program.</a:t>
+              <a:t> Decoration, separating between different parts of     the program.</a:t>
             </a:r>
             <a:endParaRPr lang="ko-KR" altLang="en-US" sz="2000" dirty="0">
               <a:cs typeface="Arial" charset="0"/>
             </a:endParaRPr>
           </a:p>
           <a:p>
+            <a:r>
+              <a:rPr lang="x-none" altLang="ko-KR" sz="2000" b="1" dirty="0">
+                <a:cs typeface="Arial" charset="0"/>
+              </a:rPr>
+              <a:t>=&gt;</a:t>
+            </a:r>
+            <a:r>
+              <a:rPr lang="ko-KR" altLang="en-US" sz="2000" b="1" dirty="0">
+                <a:cs typeface="Arial" charset="0"/>
+              </a:rPr>
+              <a:t> </a:t>
+            </a:r>
+            <a:r>
+              <a:rPr lang="x-none" altLang="ko-KR" sz="2000" b="1" dirty="0">
+                <a:cs typeface="Arial" charset="0"/>
+              </a:rPr>
+              <a:t>void </a:t>
+            </a:r>
+            <a:r>
+              <a:rPr lang="ko-KR" altLang="en-US" sz="2000" b="1" dirty="0">
+                <a:cs typeface="Arial" charset="0"/>
+              </a:rPr>
+              <a:t>Services ():</a:t>
+            </a:r>
+            <a:r>
+              <a:rPr lang="ko-KR" altLang="en-US" sz="2000" dirty="0">
+                <a:cs typeface="Arial" charset="0"/>
+              </a:rPr>
+              <a:t> Services and their selection of many options.</a:t>
+            </a:r>
             <a:endParaRPr lang="ko-KR" altLang="en-US" sz="2000" dirty="0">
               <a:cs typeface="Arial" charset="0"/>
             </a:endParaRPr>
@@ -4194,19 +4242,66 @@
               <a:rPr lang="ko-KR" altLang="en-US" sz="2000" b="1" dirty="0">
                 <a:cs typeface="Arial" charset="0"/>
               </a:rPr>
-              <a:t>Services ():</a:t>
+              <a:t>Receipt ():</a:t>
             </a:r>
             <a:r>
               <a:rPr lang="ko-KR" altLang="en-US" sz="2000" dirty="0">
                 <a:cs typeface="Arial" charset="0"/>
               </a:rPr>
-              <a:t> Services and their selection of many options.</a:t>
+              <a:t> print Receipt after service is finished.</a:t>
             </a:r>
             <a:endParaRPr lang="ko-KR" altLang="en-US" sz="2000" dirty="0">
               <a:cs typeface="Arial" charset="0"/>
             </a:endParaRPr>
           </a:p>
           <a:p>
+            <a:r>
+              <a:rPr lang="x-none" altLang="ko-KR" sz="2000" b="1" dirty="0">
+                <a:cs typeface="Arial" charset="0"/>
+              </a:rPr>
+              <a:t>=&gt; void Ongoing():</a:t>
+            </a:r>
+            <a:r>
+              <a:rPr lang="x-none" altLang="ko-KR" sz="2000" dirty="0">
+                <a:cs typeface="Arial" charset="0"/>
+              </a:rPr>
+              <a:t> stop the program for a specific amount of time  based on serivce </a:t>
+            </a:r>
+            <a:endParaRPr lang="x-none" altLang="ko-KR" sz="2000" dirty="0">
+              <a:cs typeface="Arial" charset="0"/>
+            </a:endParaRPr>
+          </a:p>
+          <a:p>
+            <a:r>
+              <a:rPr lang="x-none" altLang="ko-KR" sz="2000" b="1" dirty="0">
+                <a:cs typeface="Arial" charset="0"/>
+              </a:rPr>
+              <a:t>=&gt;</a:t>
+            </a:r>
+            <a:r>
+              <a:rPr lang="ko-KR" altLang="en-US" sz="2000" b="1" dirty="0">
+                <a:cs typeface="Arial" charset="0"/>
+              </a:rPr>
+              <a:t> </a:t>
+            </a:r>
+            <a:r>
+              <a:rPr lang="x-none" altLang="ko-KR" sz="2000" b="1" dirty="0">
+                <a:cs typeface="Arial" charset="0"/>
+              </a:rPr>
+              <a:t>void </a:t>
+            </a:r>
+            <a:r>
+              <a:rPr lang="ko-KR" altLang="en-US" sz="2000" b="1" dirty="0">
+                <a:cs typeface="Arial" charset="0"/>
+              </a:rPr>
+              <a:t>Meta ():</a:t>
+            </a:r>
+            <a:r>
+              <a:rPr lang="ko-KR" altLang="en-US" sz="2000" dirty="0">
+                <a:cs typeface="Arial" charset="0"/>
+              </a:rPr>
+              <a:t> generate a service number and get today's date. </a:t>
+            </a:r>
             <a:endParaRPr lang="ko-KR" altLang="en-US" sz="2000" dirty="0">
               <a:cs typeface="Arial" charset="0"/>
             </a:endParaRPr>
@@ -4234,24 +4329,19 @@
               <a:rPr lang="ko-KR" altLang="en-US" sz="2000" b="1" dirty="0">
                 <a:cs typeface="Arial" charset="0"/>
               </a:rPr>
-              <a:t>Receipt ():</a:t>
+              <a:t>Another_Service ():</a:t>
             </a:r>
             <a:r>
               <a:rPr lang="ko-KR" altLang="en-US" sz="2000" dirty="0">
                 <a:cs typeface="Arial" charset="0"/>
               </a:rPr>
-              <a:t> print Receipt after service is finished.</a:t>
+              <a:t> function to let user choose another      service after finishing first service.</a:t>
             </a:r>
             <a:endParaRPr lang="ko-KR" altLang="en-US" sz="2000" dirty="0">
               <a:cs typeface="Arial" charset="0"/>
             </a:endParaRPr>
           </a:p>
           <a:p>
-            <a:endParaRPr lang="ko-KR" altLang="en-US" sz="2000" dirty="0">
-              <a:cs typeface="Arial" charset="0"/>
-            </a:endParaRPr>
-          </a:p>
-          <a:p>
             <a:r>
               <a:rPr lang="x-none" altLang="ko-KR" sz="2000" b="1" dirty="0">
                 <a:cs typeface="Arial" charset="0"/>
@@ -4274,93 +4364,13 @@
               <a:rPr lang="ko-KR" altLang="en-US" sz="2000" b="1" dirty="0">
                 <a:cs typeface="Arial" charset="0"/>
               </a:rPr>
-              <a:t>Meta ():</a:t>
+              <a:t>payment():</a:t>
             </a:r>
             <a:r>
               <a:rPr lang="ko-KR" altLang="en-US" sz="2000" dirty="0">
                 <a:cs typeface="Arial" charset="0"/>
               </a:rPr>
-              <a:t> generate a service number and get today's date. </a:t>
-            </a:r>
-            <a:endParaRPr lang="ko-KR" altLang="en-US" sz="2000" dirty="0">
-              <a:cs typeface="Arial" charset="0"/>
-            </a:endParaRPr>
-          </a:p>
-          <a:p>
-            <a:endParaRPr lang="ko-KR" altLang="en-US" sz="2000" dirty="0">
-              <a:cs typeface="Arial" charset="0"/>
-            </a:endParaRPr>
-          </a:p>
-          <a:p>
-            <a:r>
-              <a:rPr lang="x-none" altLang="ko-KR" sz="2000" b="1" dirty="0">
-                <a:cs typeface="Arial" charset="0"/>
-              </a:rPr>
-              <a:t>=&gt;</a:t>
-            </a:r>
-            <a:r>
-              <a:rPr lang="ko-KR" altLang="en-US" sz="2000" b="1" dirty="0">
-                <a:cs typeface="Arial" charset="0"/>
-              </a:rPr>
-              <a:t> </a:t>
-            </a:r>
-            <a:r>
-              <a:rPr lang="x-none" altLang="ko-KR" sz="2000" b="1" dirty="0">
-                <a:cs typeface="Arial" charset="0"/>
-              </a:rPr>
-              <a:t>void </a:t>
-            </a:r>
-            <a:r>
-              <a:rPr lang="ko-KR" altLang="en-US" sz="2000" b="1" dirty="0">
-                <a:cs typeface="Arial" charset="0"/>
-              </a:rPr>
-              <a:t>Another_Service ():</a:t>
-            </a:r>
-            <a:r>
-              <a:rPr lang="ko-KR" altLang="en-US" sz="2000" dirty="0">
-                <a:cs typeface="Arial" charset="0"/>
-              </a:rPr>
-              <a:t> function to let user choose another service after finishing first service.</a:t>
-            </a:r>
-            <a:endParaRPr lang="ko-KR" altLang="en-US" sz="2000" dirty="0">
-              <a:cs typeface="Arial" charset="0"/>
-            </a:endParaRPr>
-          </a:p>
-          <a:p>
-            <a:endParaRPr lang="ko-KR" altLang="en-US" sz="2000" dirty="0">
-              <a:cs typeface="Arial" charset="0"/>
-            </a:endParaRPr>
-          </a:p>
-          <a:p>
-            <a:r>
-              <a:rPr lang="x-none" altLang="ko-KR" sz="2000" b="1" dirty="0">
-                <a:cs typeface="Arial" charset="0"/>
-              </a:rPr>
-              <a:t>=&gt;</a:t>
-            </a:r>
-            <a:r>
-              <a:rPr lang="ko-KR" altLang="en-US" sz="2000" b="1" dirty="0">
-                <a:cs typeface="Arial" charset="0"/>
-              </a:rPr>
-              <a:t> </a:t>
-            </a:r>
-            <a:r>
-              <a:rPr lang="x-none" altLang="ko-KR" sz="2000" b="1" dirty="0">
-                <a:cs typeface="Arial" charset="0"/>
-              </a:rPr>
-              <a:t>void </a:t>
-            </a:r>
-            <a:r>
-              <a:rPr lang="ko-KR" altLang="en-US" sz="2000" b="1" dirty="0">
-                <a:cs typeface="Arial" charset="0"/>
-              </a:rPr>
-              <a:t>payment():</a:t>
-            </a:r>
-            <a:r>
-              <a:rPr lang="ko-KR" altLang="en-US" sz="2000" dirty="0">
-                <a:cs typeface="Arial" charset="0"/>
-              </a:rPr>
-              <a:t> function to calculate the total price of washing process with various types of service and for different </a:t>
+              <a:t> function to calculate the total price of washing   process with various types of service and for different </a:t>
             </a:r>
             <a:r>
               <a:rPr lang="x-none" altLang="ko-KR" sz="2000" dirty="0">

</xml_diff>

<commit_message>
let user do multiple serices(3 max) before printing receipt
</commit_message>
<xml_diff>
--- a/project/presentation.pptx
+++ b/project/presentation.pptx
@@ -4574,7 +4574,7 @@
       </p:sp>
       <p:pic>
         <p:nvPicPr>
-          <p:cNvPr id="5" name="Picture 4" descr="Screenshot_20180514_002159"/>
+          <p:cNvPr id="2" name="Picture 1" descr="Screenshot_20180516_143201"/>
           <p:cNvPicPr>
             <a:picLocks noChangeAspect="1"/>
           </p:cNvPicPr>
@@ -4588,8 +4588,8 @@
         </p:blipFill>
         <p:spPr>
           <a:xfrm>
-            <a:off x="1763395" y="1124585"/>
-            <a:ext cx="7198995" cy="5157470"/>
+            <a:off x="1485900" y="838200"/>
+            <a:ext cx="7699375" cy="5333365"/>
           </a:xfrm>
           <a:prstGeom prst="rect">
             <a:avLst/>

</xml_diff>